<commit_message>
link to david's book in overview has been updated
</commit_message>
<xml_diff>
--- a/cits1003-lecture_slides/CITS1003-0 Overview.pptx
+++ b/cits1003-lecture_slides/CITS1003-0 Overview.pptx
@@ -5419,7 +5419,7 @@
           <a:p>
             <a:fld id="{6D6D7260-B7E4-B548-BD1F-84ED14536037}" type="datetimeFigureOut">
               <a:rPr lang="en-AU" smtClean="0"/>
-              <a:t>26/02/2024</a:t>
+              <a:t>5/03/2024</a:t>
             </a:fld>
             <a:endParaRPr lang="en-AU"/>
           </a:p>
@@ -9326,7 +9326,7 @@
           <a:p>
             <a:fld id="{88D38747-4367-4BD2-8D51-C97E202738E2}" type="datetime1">
               <a:rPr lang="en-US" smtClean="0"/>
-              <a:t>2/26/2024</a:t>
+              <a:t>3/5/2024</a:t>
             </a:fld>
             <a:endParaRPr lang="en-US" dirty="0"/>
           </a:p>
@@ -9631,7 +9631,7 @@
           <a:p>
             <a:fld id="{11F1B079-7EF0-44EE-B798-BCC497C9F3B2}" type="datetime1">
               <a:rPr lang="en-US" smtClean="0"/>
-              <a:t>2/26/2024</a:t>
+              <a:t>3/5/2024</a:t>
             </a:fld>
             <a:endParaRPr lang="en-US" dirty="0"/>
           </a:p>
@@ -9825,7 +9825,7 @@
           <a:p>
             <a:fld id="{28FF70A8-1D13-4657-95F0-A9EA54967B8D}" type="datetime1">
               <a:rPr lang="en-US" smtClean="0"/>
-              <a:t>2/26/2024</a:t>
+              <a:t>3/5/2024</a:t>
             </a:fld>
             <a:endParaRPr lang="en-US" dirty="0"/>
           </a:p>
@@ -10088,7 +10088,7 @@
           <a:p>
             <a:fld id="{21EB90AC-71BD-4C7F-8ACA-7B3F18292E63}" type="datetime1">
               <a:rPr lang="en-US" smtClean="0"/>
-              <a:t>2/26/2024</a:t>
+              <a:t>3/5/2024</a:t>
             </a:fld>
             <a:endParaRPr lang="en-US" dirty="0"/>
           </a:p>
@@ -10524,7 +10524,7 @@
           <a:p>
             <a:fld id="{4E6EFC2C-8905-46F0-B443-CE905B76BA01}" type="datetime1">
               <a:rPr lang="en-US" smtClean="0"/>
-              <a:t>2/26/2024</a:t>
+              <a:t>3/5/2024</a:t>
             </a:fld>
             <a:endParaRPr lang="en-US" dirty="0"/>
           </a:p>
@@ -11061,7 +11061,7 @@
           <a:p>
             <a:fld id="{D9079DC3-C9B5-499E-9140-0DC28B7074E2}" type="datetime1">
               <a:rPr lang="en-US" smtClean="0"/>
-              <a:t>2/26/2024</a:t>
+              <a:t>3/5/2024</a:t>
             </a:fld>
             <a:endParaRPr lang="en-US" dirty="0"/>
           </a:p>
@@ -11943,7 +11943,7 @@
           <a:p>
             <a:fld id="{30BB33EA-E472-4D22-9C03-A9C14AA21CED}" type="datetime1">
               <a:rPr lang="en-US" smtClean="0"/>
-              <a:t>2/26/2024</a:t>
+              <a:t>3/5/2024</a:t>
             </a:fld>
             <a:endParaRPr lang="en-US" dirty="0"/>
           </a:p>
@@ -12113,7 +12113,7 @@
           <a:p>
             <a:fld id="{217E833E-1B6D-415F-AD29-75AE8C43BD0D}" type="datetime1">
               <a:rPr lang="en-US" smtClean="0"/>
-              <a:t>2/26/2024</a:t>
+              <a:t>3/5/2024</a:t>
             </a:fld>
             <a:endParaRPr lang="en-US" dirty="0"/>
           </a:p>
@@ -12297,7 +12297,7 @@
           <a:p>
             <a:fld id="{8452596F-08A7-4B70-989A-F2B1CF31E66B}" type="datetime1">
               <a:rPr lang="en-US" smtClean="0"/>
-              <a:t>2/26/2024</a:t>
+              <a:t>3/5/2024</a:t>
             </a:fld>
             <a:endParaRPr lang="en-US" dirty="0"/>
           </a:p>
@@ -12467,7 +12467,7 @@
           <a:p>
             <a:fld id="{73C55A3C-5767-4844-A0A3-83778C2E5409}" type="datetime1">
               <a:rPr lang="en-US" smtClean="0"/>
-              <a:t>2/26/2024</a:t>
+              <a:t>3/5/2024</a:t>
             </a:fld>
             <a:endParaRPr lang="en-US" dirty="0"/>
           </a:p>
@@ -12711,7 +12711,7 @@
           <a:p>
             <a:fld id="{CAE507A8-A5CF-4D38-AB86-7EDDA87A85D4}" type="datetime1">
               <a:rPr lang="en-US" smtClean="0"/>
-              <a:t>2/26/2024</a:t>
+              <a:t>3/5/2024</a:t>
             </a:fld>
             <a:endParaRPr lang="en-US" dirty="0"/>
           </a:p>
@@ -12953,7 +12953,7 @@
           <a:p>
             <a:fld id="{BDFCD27C-8599-43EF-BA1D-14DDC1946E06}" type="datetime1">
               <a:rPr lang="en-US" smtClean="0"/>
-              <a:t>2/26/2024</a:t>
+              <a:t>3/5/2024</a:t>
             </a:fld>
             <a:endParaRPr lang="en-US" dirty="0"/>
           </a:p>
@@ -13434,7 +13434,7 @@
           <a:p>
             <a:fld id="{49343D99-809A-49C0-96E5-4250D0B498EE}" type="datetime1">
               <a:rPr lang="en-US" smtClean="0"/>
-              <a:t>2/26/2024</a:t>
+              <a:t>3/5/2024</a:t>
             </a:fld>
             <a:endParaRPr lang="en-US" dirty="0"/>
           </a:p>
@@ -13552,7 +13552,7 @@
           <a:p>
             <a:fld id="{A143DE9B-B678-4EFB-BB7D-A4370204A0B0}" type="datetime1">
               <a:rPr lang="en-US" smtClean="0"/>
-              <a:t>2/26/2024</a:t>
+              <a:t>3/5/2024</a:t>
             </a:fld>
             <a:endParaRPr lang="en-US" dirty="0"/>
           </a:p>
@@ -13647,7 +13647,7 @@
           <a:p>
             <a:fld id="{E68812DA-F765-4142-A6A3-A8ED7235E082}" type="datetime1">
               <a:rPr lang="en-US" smtClean="0"/>
-              <a:t>2/26/2024</a:t>
+              <a:t>3/5/2024</a:t>
             </a:fld>
             <a:endParaRPr lang="en-US" dirty="0"/>
           </a:p>
@@ -13902,7 +13902,7 @@
           <a:p>
             <a:fld id="{3E0277FD-7DE6-41D4-930D-AC99F5AFE54E}" type="datetime1">
               <a:rPr lang="en-US" smtClean="0"/>
-              <a:t>2/26/2024</a:t>
+              <a:t>3/5/2024</a:t>
             </a:fld>
             <a:endParaRPr lang="en-US" dirty="0"/>
           </a:p>
@@ -14209,7 +14209,7 @@
           <a:p>
             <a:fld id="{9EA15526-7079-4B7B-987C-1B5FAE11A0FF}" type="datetime1">
               <a:rPr lang="en-US" smtClean="0"/>
-              <a:t>2/26/2024</a:t>
+              <a:t>3/5/2024</a:t>
             </a:fld>
             <a:endParaRPr lang="en-US" dirty="0"/>
           </a:p>
@@ -14444,7 +14444,7 @@
           <a:p>
             <a:fld id="{073ED0CC-082F-4160-86E5-0D6041F12778}" type="datetime1">
               <a:rPr lang="en-US" smtClean="0"/>
-              <a:t>2/26/2024</a:t>
+              <a:t>3/5/2024</a:t>
             </a:fld>
             <a:endParaRPr lang="en-US" dirty="0"/>
           </a:p>
@@ -15355,7 +15355,7 @@
           </a:effectLst>
           <a:extLst>
             <a:ext uri="{91240B29-F687-4f45-9708-019B960494DF}">
-              <a14:hiddenLine xmlns="" xmlns:a14="http://schemas.microsoft.com/office/drawing/2010/main" w="9525">
+              <a14:hiddenLine xmlns:a14="http://schemas.microsoft.com/office/drawing/2010/main" xmlns="" w="9525">
                 <a:solidFill>
                   <a:srgbClr val="000000"/>
                 </a:solidFill>
@@ -19160,7 +19160,9 @@
           </a:xfrm>
         </p:spPr>
         <p:txBody>
-          <a:bodyPr/>
+          <a:bodyPr>
+            <a:normAutofit lnSpcReduction="10000"/>
+          </a:bodyPr>
           <a:lstStyle/>
           <a:p>
             <a:r>
@@ -19173,6 +19175,16 @@
           </a:p>
           <a:p>
             <a:pPr lvl="1"/>
+            <a:r>
+              <a:rPr lang="en-AU" b="0" i="0" u="none" strike="noStrike" dirty="0">
+                <a:solidFill>
+                  <a:srgbClr val="92D050"/>
+                </a:solidFill>
+                <a:effectLst/>
+                <a:latin typeface="Roboto" panose="02000000000000000000" pitchFamily="2" charset="0"/>
+              </a:rPr>
+              <a:t>https://2772132586-files.gitbook.io/~/files/v0/b/gitbook-legacy-files/o/assets%2F-M8JUFT2qjA1kHV7SeEI%2F-MbKnPR4PgdotRQvCM-D%2F-MbKqReUfLRQ5bE-3gR3%2FEthicalHackingHTBDGv1.pdf?alt=media&amp;token=6a805194-ead2-44d1-aaa3-98fa03084b91</a:t>
+            </a:r>
             <a:r>
               <a:rPr lang="en-AU" dirty="0">
                 <a:solidFill>
@@ -19181,7 +19193,7 @@
                 <a:latin typeface="Arial" panose="020B0604020202020204" pitchFamily="34" charset="0"/>
                 <a:cs typeface="Arial" panose="020B0604020202020204" pitchFamily="34" charset="0"/>
               </a:rPr>
-              <a:t>https://book.ethicalhackinghtb.xyz/ </a:t>
+              <a:t> </a:t>
             </a:r>
           </a:p>
           <a:p>
@@ -19877,7 +19889,7 @@
           <a:noFill/>
           <a:extLst>
             <a:ext uri="{909E8E84-426E-40dd-AFC4-6F175D3DCCD1}">
-              <a14:hiddenFill xmlns="" xmlns:a14="http://schemas.microsoft.com/office/drawing/2010/main">
+              <a14:hiddenFill xmlns:a14="http://schemas.microsoft.com/office/drawing/2010/main" xmlns="">
                 <a:solidFill>
                   <a:srgbClr val="FFFFFF"/>
                 </a:solidFill>
@@ -23218,7 +23230,7 @@
           <a:noFill/>
           <a:extLst>
             <a:ext uri="{909E8E84-426E-40dd-AFC4-6F175D3DCCD1}">
-              <a14:hiddenFill xmlns="" xmlns:a14="http://schemas.microsoft.com/office/drawing/2010/main">
+              <a14:hiddenFill xmlns:a14="http://schemas.microsoft.com/office/drawing/2010/main" xmlns="">
                 <a:solidFill>
                   <a:srgbClr val="FFFFFF"/>
                 </a:solidFill>
@@ -23300,7 +23312,7 @@
           <a:noFill/>
           <a:extLst>
             <a:ext uri="{909E8E84-426E-40dd-AFC4-6F175D3DCCD1}">
-              <a14:hiddenFill xmlns="" xmlns:a14="http://schemas.microsoft.com/office/drawing/2010/main">
+              <a14:hiddenFill xmlns:a14="http://schemas.microsoft.com/office/drawing/2010/main" xmlns="">
                 <a:solidFill>
                   <a:srgbClr val="FFFFFF"/>
                 </a:solidFill>
@@ -23377,7 +23389,7 @@
           <a:noFill/>
           <a:extLst>
             <a:ext uri="{909E8E84-426E-40dd-AFC4-6F175D3DCCD1}">
-              <a14:hiddenFill xmlns="" xmlns:a14="http://schemas.microsoft.com/office/drawing/2010/main">
+              <a14:hiddenFill xmlns:a14="http://schemas.microsoft.com/office/drawing/2010/main" xmlns="">
                 <a:solidFill>
                   <a:srgbClr val="FFFFFF"/>
                 </a:solidFill>
@@ -23424,7 +23436,7 @@
           <a:noFill/>
           <a:extLst>
             <a:ext uri="{909E8E84-426E-40dd-AFC4-6F175D3DCCD1}">
-              <a14:hiddenFill xmlns="" xmlns:a14="http://schemas.microsoft.com/office/drawing/2010/main">
+              <a14:hiddenFill xmlns:a14="http://schemas.microsoft.com/office/drawing/2010/main" xmlns="">
                 <a:solidFill>
                   <a:srgbClr val="FFFFFF"/>
                 </a:solidFill>
@@ -23471,7 +23483,7 @@
           <a:noFill/>
           <a:extLst>
             <a:ext uri="{909E8E84-426E-40dd-AFC4-6F175D3DCCD1}">
-              <a14:hiddenFill xmlns="" xmlns:a14="http://schemas.microsoft.com/office/drawing/2010/main">
+              <a14:hiddenFill xmlns:a14="http://schemas.microsoft.com/office/drawing/2010/main" xmlns="">
                 <a:solidFill>
                   <a:srgbClr val="FFFFFF"/>
                 </a:solidFill>
@@ -24058,7 +24070,7 @@
           <a:noFill/>
           <a:extLst>
             <a:ext uri="{909E8E84-426E-40dd-AFC4-6F175D3DCCD1}">
-              <a14:hiddenFill xmlns="" xmlns:a14="http://schemas.microsoft.com/office/drawing/2010/main">
+              <a14:hiddenFill xmlns:a14="http://schemas.microsoft.com/office/drawing/2010/main" xmlns="">
                 <a:solidFill>
                   <a:srgbClr val="FFFFFF"/>
                 </a:solidFill>
@@ -24105,7 +24117,7 @@
           <a:noFill/>
           <a:extLst>
             <a:ext uri="{909E8E84-426E-40dd-AFC4-6F175D3DCCD1}">
-              <a14:hiddenFill xmlns="" xmlns:a14="http://schemas.microsoft.com/office/drawing/2010/main">
+              <a14:hiddenFill xmlns:a14="http://schemas.microsoft.com/office/drawing/2010/main" xmlns="">
                 <a:solidFill>
                   <a:srgbClr val="FFFFFF"/>
                 </a:solidFill>
@@ -24152,7 +24164,7 @@
           <a:noFill/>
           <a:extLst>
             <a:ext uri="{909E8E84-426E-40dd-AFC4-6F175D3DCCD1}">
-              <a14:hiddenFill xmlns="" xmlns:a14="http://schemas.microsoft.com/office/drawing/2010/main">
+              <a14:hiddenFill xmlns:a14="http://schemas.microsoft.com/office/drawing/2010/main" xmlns="">
                 <a:solidFill>
                   <a:srgbClr val="FFFFFF"/>
                 </a:solidFill>
@@ -24199,7 +24211,7 @@
           <a:noFill/>
           <a:extLst>
             <a:ext uri="{909E8E84-426E-40dd-AFC4-6F175D3DCCD1}">
-              <a14:hiddenFill xmlns="" xmlns:a14="http://schemas.microsoft.com/office/drawing/2010/main">
+              <a14:hiddenFill xmlns:a14="http://schemas.microsoft.com/office/drawing/2010/main" xmlns="">
                 <a:solidFill>
                   <a:srgbClr val="FFFFFF"/>
                 </a:solidFill>
@@ -24246,7 +24258,7 @@
           <a:noFill/>
           <a:extLst>
             <a:ext uri="{909E8E84-426E-40dd-AFC4-6F175D3DCCD1}">
-              <a14:hiddenFill xmlns="" xmlns:a14="http://schemas.microsoft.com/office/drawing/2010/main">
+              <a14:hiddenFill xmlns:a14="http://schemas.microsoft.com/office/drawing/2010/main" xmlns="">
                 <a:solidFill>
                   <a:srgbClr val="FFFFFF"/>
                 </a:solidFill>

</xml_diff>